<commit_message>
writing pictures title to alt tag
</commit_message>
<xml_diff>
--- a/1_projekt/Bemutató V.CS.P.pptx
+++ b/1_projekt/Bemutató V.CS.P.pptx
@@ -7,7 +7,9 @@
   <p:sldIdLst>
     <p:sldId id="256" r:id="rId2"/>
     <p:sldId id="257" r:id="rId3"/>
-    <p:sldId id="258" r:id="rId4"/>
+    <p:sldId id="259" r:id="rId4"/>
+    <p:sldId id="258" r:id="rId5"/>
+    <p:sldId id="260" r:id="rId6"/>
   </p:sldIdLst>
   <p:sldSz cx="12192000" cy="6858000"/>
   <p:notesSz cx="6858000" cy="9144000"/>
@@ -106,6 +108,11 @@
       </a:defRPr>
     </a:lvl9pPr>
   </p:defaultTextStyle>
+  <p:extLst>
+    <p:ext uri="{EFAFB233-063F-42B5-8137-9DF3F51BA10A}">
+      <p15:sldGuideLst xmlns:p15="http://schemas.microsoft.com/office/powerpoint/2012/main"/>
+    </p:ext>
+  </p:extLst>
 </p:presentation>
 </file>
 
@@ -256,7 +263,7 @@
           <a:p>
             <a:fld id="{8DD71B1E-7476-4238-9F75-2DD8BAB20716}" type="datetimeFigureOut">
               <a:rPr lang="hu-HU" smtClean="0"/>
-              <a:t>2023. 10. 09.</a:t>
+              <a:t>2023. 10. 10.</a:t>
             </a:fld>
             <a:endParaRPr lang="hu-HU"/>
           </a:p>
@@ -454,7 +461,7 @@
           <a:p>
             <a:fld id="{8DD71B1E-7476-4238-9F75-2DD8BAB20716}" type="datetimeFigureOut">
               <a:rPr lang="hu-HU" smtClean="0"/>
-              <a:t>2023. 10. 09.</a:t>
+              <a:t>2023. 10. 10.</a:t>
             </a:fld>
             <a:endParaRPr lang="hu-HU"/>
           </a:p>
@@ -662,7 +669,7 @@
           <a:p>
             <a:fld id="{8DD71B1E-7476-4238-9F75-2DD8BAB20716}" type="datetimeFigureOut">
               <a:rPr lang="hu-HU" smtClean="0"/>
-              <a:t>2023. 10. 09.</a:t>
+              <a:t>2023. 10. 10.</a:t>
             </a:fld>
             <a:endParaRPr lang="hu-HU"/>
           </a:p>
@@ -860,7 +867,7 @@
           <a:p>
             <a:fld id="{8DD71B1E-7476-4238-9F75-2DD8BAB20716}" type="datetimeFigureOut">
               <a:rPr lang="hu-HU" smtClean="0"/>
-              <a:t>2023. 10. 09.</a:t>
+              <a:t>2023. 10. 10.</a:t>
             </a:fld>
             <a:endParaRPr lang="hu-HU"/>
           </a:p>
@@ -1135,7 +1142,7 @@
           <a:p>
             <a:fld id="{8DD71B1E-7476-4238-9F75-2DD8BAB20716}" type="datetimeFigureOut">
               <a:rPr lang="hu-HU" smtClean="0"/>
-              <a:t>2023. 10. 09.</a:t>
+              <a:t>2023. 10. 10.</a:t>
             </a:fld>
             <a:endParaRPr lang="hu-HU"/>
           </a:p>
@@ -1400,7 +1407,7 @@
           <a:p>
             <a:fld id="{8DD71B1E-7476-4238-9F75-2DD8BAB20716}" type="datetimeFigureOut">
               <a:rPr lang="hu-HU" smtClean="0"/>
-              <a:t>2023. 10. 09.</a:t>
+              <a:t>2023. 10. 10.</a:t>
             </a:fld>
             <a:endParaRPr lang="hu-HU"/>
           </a:p>
@@ -1812,7 +1819,7 @@
           <a:p>
             <a:fld id="{8DD71B1E-7476-4238-9F75-2DD8BAB20716}" type="datetimeFigureOut">
               <a:rPr lang="hu-HU" smtClean="0"/>
-              <a:t>2023. 10. 09.</a:t>
+              <a:t>2023. 10. 10.</a:t>
             </a:fld>
             <a:endParaRPr lang="hu-HU"/>
           </a:p>
@@ -1953,7 +1960,7 @@
           <a:p>
             <a:fld id="{8DD71B1E-7476-4238-9F75-2DD8BAB20716}" type="datetimeFigureOut">
               <a:rPr lang="hu-HU" smtClean="0"/>
-              <a:t>2023. 10. 09.</a:t>
+              <a:t>2023. 10. 10.</a:t>
             </a:fld>
             <a:endParaRPr lang="hu-HU"/>
           </a:p>
@@ -2066,7 +2073,7 @@
           <a:p>
             <a:fld id="{8DD71B1E-7476-4238-9F75-2DD8BAB20716}" type="datetimeFigureOut">
               <a:rPr lang="hu-HU" smtClean="0"/>
-              <a:t>2023. 10. 09.</a:t>
+              <a:t>2023. 10. 10.</a:t>
             </a:fld>
             <a:endParaRPr lang="hu-HU"/>
           </a:p>
@@ -2377,7 +2384,7 @@
           <a:p>
             <a:fld id="{8DD71B1E-7476-4238-9F75-2DD8BAB20716}" type="datetimeFigureOut">
               <a:rPr lang="hu-HU" smtClean="0"/>
-              <a:t>2023. 10. 09.</a:t>
+              <a:t>2023. 10. 10.</a:t>
             </a:fld>
             <a:endParaRPr lang="hu-HU"/>
           </a:p>
@@ -2665,7 +2672,7 @@
           <a:p>
             <a:fld id="{8DD71B1E-7476-4238-9F75-2DD8BAB20716}" type="datetimeFigureOut">
               <a:rPr lang="hu-HU" smtClean="0"/>
-              <a:t>2023. 10. 09.</a:t>
+              <a:t>2023. 10. 10.</a:t>
             </a:fld>
             <a:endParaRPr lang="hu-HU"/>
           </a:p>
@@ -2924,7 +2931,7 @@
           <a:p>
             <a:fld id="{8DD71B1E-7476-4238-9F75-2DD8BAB20716}" type="datetimeFigureOut">
               <a:rPr lang="hu-HU" smtClean="0"/>
-              <a:t>2023. 10. 09.</a:t>
+              <a:t>2023. 10. 10.</a:t>
             </a:fld>
             <a:endParaRPr lang="hu-HU"/>
           </a:p>
@@ -3607,12 +3614,12 @@
           <a:p>
             <a:pPr algn="ctr"/>
             <a:r>
-              <a:rPr lang="hu-HU" dirty="0" err="1">
+              <a:rPr lang="hu-HU" b="1" dirty="0" err="1">
                 <a:latin typeface="Aptos Narrow" panose="020B0004020202020204" pitchFamily="34" charset="0"/>
               </a:rPr>
               <a:t>Insprációnk</a:t>
             </a:r>
-            <a:endParaRPr lang="hu-HU" dirty="0">
+            <a:endParaRPr lang="hu-HU" b="1" dirty="0">
               <a:latin typeface="Aptos Narrow" panose="020B0004020202020204" pitchFamily="34" charset="0"/>
             </a:endParaRPr>
           </a:p>
@@ -3622,6 +3629,126 @@
     <p:extLst>
       <p:ext uri="{BB962C8B-B14F-4D97-AF65-F5344CB8AC3E}">
         <p14:creationId xmlns:p14="http://schemas.microsoft.com/office/powerpoint/2010/main" val="1544178237"/>
+      </p:ext>
+    </p:extLst>
+  </p:cSld>
+  <p:clrMapOvr>
+    <a:masterClrMapping/>
+  </p:clrMapOvr>
+</p:sld>
+</file>
+
+<file path=ppt/slides/slide3.xml><?xml version="1.0" encoding="utf-8"?>
+<p:sld xmlns:a="http://schemas.openxmlformats.org/drawingml/2006/main" xmlns:r="http://schemas.openxmlformats.org/officeDocument/2006/relationships" xmlns:p="http://schemas.openxmlformats.org/presentationml/2006/main">
+  <p:cSld>
+    <p:spTree>
+      <p:nvGrpSpPr>
+        <p:cNvPr id="1" name=""/>
+        <p:cNvGrpSpPr/>
+        <p:nvPr/>
+      </p:nvGrpSpPr>
+      <p:grpSpPr>
+        <a:xfrm>
+          <a:off x="0" y="0"/>
+          <a:ext cx="0" cy="0"/>
+          <a:chOff x="0" y="0"/>
+          <a:chExt cx="0" cy="0"/>
+        </a:xfrm>
+      </p:grpSpPr>
+      <p:pic>
+        <p:nvPicPr>
+          <p:cNvPr id="3" name="Kép 2">
+            <a:extLst>
+              <a:ext uri="{FF2B5EF4-FFF2-40B4-BE49-F238E27FC236}">
+                <a16:creationId xmlns:a16="http://schemas.microsoft.com/office/drawing/2014/main" id="{C123B041-C929-21B2-CA8A-4FB769882943}"/>
+              </a:ext>
+            </a:extLst>
+          </p:cNvPr>
+          <p:cNvPicPr>
+            <a:picLocks noChangeAspect="1"/>
+          </p:cNvPicPr>
+          <p:nvPr/>
+        </p:nvPicPr>
+        <p:blipFill>
+          <a:blip r:embed="rId2"/>
+          <a:stretch>
+            <a:fillRect/>
+          </a:stretch>
+        </p:blipFill>
+        <p:spPr>
+          <a:xfrm>
+            <a:off x="895531" y="581579"/>
+            <a:ext cx="2687773" cy="5694839"/>
+          </a:xfrm>
+          <a:prstGeom prst="rect">
+            <a:avLst/>
+          </a:prstGeom>
+        </p:spPr>
+      </p:pic>
+      <p:pic>
+        <p:nvPicPr>
+          <p:cNvPr id="4" name="Kép 3">
+            <a:extLst>
+              <a:ext uri="{FF2B5EF4-FFF2-40B4-BE49-F238E27FC236}">
+                <a16:creationId xmlns:a16="http://schemas.microsoft.com/office/drawing/2014/main" id="{2F4A4AE3-5798-C5DF-C6A1-467B6019A37D}"/>
+              </a:ext>
+            </a:extLst>
+          </p:cNvPr>
+          <p:cNvPicPr>
+            <a:picLocks noChangeAspect="1"/>
+          </p:cNvPicPr>
+          <p:nvPr/>
+        </p:nvPicPr>
+        <p:blipFill>
+          <a:blip r:embed="rId3"/>
+          <a:stretch>
+            <a:fillRect/>
+          </a:stretch>
+        </p:blipFill>
+        <p:spPr>
+          <a:xfrm>
+            <a:off x="8608696" y="576164"/>
+            <a:ext cx="2341067" cy="5700254"/>
+          </a:xfrm>
+          <a:prstGeom prst="rect">
+            <a:avLst/>
+          </a:prstGeom>
+        </p:spPr>
+      </p:pic>
+      <p:pic>
+        <p:nvPicPr>
+          <p:cNvPr id="5" name="Kép 4">
+            <a:extLst>
+              <a:ext uri="{FF2B5EF4-FFF2-40B4-BE49-F238E27FC236}">
+                <a16:creationId xmlns:a16="http://schemas.microsoft.com/office/drawing/2014/main" id="{7220BC91-6A5D-9E6C-7BBB-E04DA3B2298E}"/>
+              </a:ext>
+            </a:extLst>
+          </p:cNvPr>
+          <p:cNvPicPr>
+            <a:picLocks noChangeAspect="1"/>
+          </p:cNvPicPr>
+          <p:nvPr/>
+        </p:nvPicPr>
+        <p:blipFill>
+          <a:blip r:embed="rId4"/>
+          <a:stretch>
+            <a:fillRect/>
+          </a:stretch>
+        </p:blipFill>
+        <p:spPr>
+          <a:xfrm>
+            <a:off x="4490544" y="577618"/>
+            <a:ext cx="3210912" cy="5698800"/>
+          </a:xfrm>
+          <a:prstGeom prst="rect">
+            <a:avLst/>
+          </a:prstGeom>
+        </p:spPr>
+      </p:pic>
+    </p:spTree>
+    <p:extLst>
+      <p:ext uri="{BB962C8B-B14F-4D97-AF65-F5344CB8AC3E}">
+        <p14:creationId xmlns:p14="http://schemas.microsoft.com/office/powerpoint/2010/main" val="3403745597"/>
       </p:ext>
     </p:extLst>
   </p:cSld>
@@ -3649,7 +3776,7 @@
                             </p:stCondLst>
                             <p:childTnLst>
                               <p:par>
-                                <p:cTn id="5" presetID="10" presetClass="entr" presetSubtype="0" fill="hold" grpId="0" nodeType="clickEffect">
+                                <p:cTn id="5" presetID="10" presetClass="entr" presetSubtype="0" fill="hold" nodeType="clickEffect">
                                   <p:stCondLst>
                                     <p:cond delay="0"/>
                                   </p:stCondLst>
@@ -3662,7 +3789,7 @@
                                           </p:stCondLst>
                                         </p:cTn>
                                         <p:tgtEl>
-                                          <p:spTgt spid="2"/>
+                                          <p:spTgt spid="5"/>
                                         </p:tgtEl>
                                         <p:attrNameLst>
                                           <p:attrName>style.visibility</p:attrName>
@@ -3676,7 +3803,113 @@
                                       <p:cBhvr>
                                         <p:cTn id="7" dur="500"/>
                                         <p:tgtEl>
-                                          <p:spTgt spid="2"/>
+                                          <p:spTgt spid="5"/>
+                                        </p:tgtEl>
+                                      </p:cBhvr>
+                                    </p:animEffect>
+                                  </p:childTnLst>
+                                </p:cTn>
+                              </p:par>
+                            </p:childTnLst>
+                          </p:cTn>
+                        </p:par>
+                      </p:childTnLst>
+                    </p:cTn>
+                  </p:par>
+                  <p:par>
+                    <p:cTn id="8" fill="hold">
+                      <p:stCondLst>
+                        <p:cond delay="indefinite"/>
+                      </p:stCondLst>
+                      <p:childTnLst>
+                        <p:par>
+                          <p:cTn id="9" fill="hold">
+                            <p:stCondLst>
+                              <p:cond delay="0"/>
+                            </p:stCondLst>
+                            <p:childTnLst>
+                              <p:par>
+                                <p:cTn id="10" presetID="10" presetClass="entr" presetSubtype="0" fill="hold" nodeType="clickEffect">
+                                  <p:stCondLst>
+                                    <p:cond delay="0"/>
+                                  </p:stCondLst>
+                                  <p:childTnLst>
+                                    <p:set>
+                                      <p:cBhvr>
+                                        <p:cTn id="11" dur="1" fill="hold">
+                                          <p:stCondLst>
+                                            <p:cond delay="0"/>
+                                          </p:stCondLst>
+                                        </p:cTn>
+                                        <p:tgtEl>
+                                          <p:spTgt spid="3"/>
+                                        </p:tgtEl>
+                                        <p:attrNameLst>
+                                          <p:attrName>style.visibility</p:attrName>
+                                        </p:attrNameLst>
+                                      </p:cBhvr>
+                                      <p:to>
+                                        <p:strVal val="visible"/>
+                                      </p:to>
+                                    </p:set>
+                                    <p:animEffect transition="in" filter="fade">
+                                      <p:cBhvr>
+                                        <p:cTn id="12" dur="500"/>
+                                        <p:tgtEl>
+                                          <p:spTgt spid="3"/>
+                                        </p:tgtEl>
+                                      </p:cBhvr>
+                                    </p:animEffect>
+                                  </p:childTnLst>
+                                </p:cTn>
+                              </p:par>
+                            </p:childTnLst>
+                          </p:cTn>
+                        </p:par>
+                      </p:childTnLst>
+                    </p:cTn>
+                  </p:par>
+                  <p:par>
+                    <p:cTn id="13" fill="hold">
+                      <p:stCondLst>
+                        <p:cond delay="indefinite"/>
+                      </p:stCondLst>
+                      <p:childTnLst>
+                        <p:par>
+                          <p:cTn id="14" fill="hold">
+                            <p:stCondLst>
+                              <p:cond delay="0"/>
+                            </p:stCondLst>
+                            <p:childTnLst>
+                              <p:par>
+                                <p:cTn id="15" presetID="10" presetClass="entr" presetSubtype="0" fill="hold" nodeType="clickEffect">
+                                  <p:stCondLst>
+                                    <p:cond delay="0"/>
+                                  </p:stCondLst>
+                                  <p:childTnLst>
+                                    <p:set>
+                                      <p:cBhvr>
+                                        <p:cTn id="16" dur="1" fill="hold">
+                                          <p:stCondLst>
+                                            <p:cond delay="0"/>
+                                          </p:stCondLst>
+                                        </p:cTn>
+                                        <p:tgtEl>
+                                          <p:spTgt spid="4"/>
+                                        </p:tgtEl>
+                                        <p:attrNameLst>
+                                          <p:attrName>style.visibility</p:attrName>
+                                        </p:attrNameLst>
+                                      </p:cBhvr>
+                                      <p:to>
+                                        <p:strVal val="visible"/>
+                                      </p:to>
+                                    </p:set>
+                                    <p:animEffect transition="in" filter="fade">
+                                      <p:cBhvr>
+                                        <p:cTn id="17" dur="500"/>
+                                        <p:tgtEl>
+                                          <p:spTgt spid="4"/>
                                         </p:tgtEl>
                                       </p:cBhvr>
                                     </p:animEffect>
@@ -3710,14 +3943,11 @@
         </p:cTn>
       </p:par>
     </p:tnLst>
-    <p:bldLst>
-      <p:bldP spid="2" grpId="0"/>
-    </p:bldLst>
   </p:timing>
 </p:sld>
 </file>
 
-<file path=ppt/slides/slide3.xml><?xml version="1.0" encoding="utf-8"?>
+<file path=ppt/slides/slide4.xml><?xml version="1.0" encoding="utf-8"?>
 <p:sld xmlns:a="http://schemas.openxmlformats.org/drawingml/2006/main" xmlns:r="http://schemas.openxmlformats.org/officeDocument/2006/relationships" xmlns:p="http://schemas.openxmlformats.org/presentationml/2006/main">
   <p:cSld>
     <p:spTree>
@@ -3756,7 +3986,7 @@
           <a:lstStyle/>
           <a:p>
             <a:r>
-              <a:rPr lang="hu-HU" dirty="0">
+              <a:rPr lang="hu-HU" sz="3600" dirty="0">
                 <a:latin typeface="Aptos Narrow" panose="020B0004020202020204" pitchFamily="34" charset="0"/>
               </a:rPr>
               <a:t>Olyan weboldalt szerettünk volna alkotni, amely könnyen kezelhető, átlátható, és modern letisztult stílusú.</a:t>
@@ -3774,7 +4004,7 @@
           </a:p>
           <a:p>
             <a:r>
-              <a:rPr lang="hu-HU" dirty="0">
+              <a:rPr lang="hu-HU" sz="3600" dirty="0">
                 <a:latin typeface="Aptos Narrow" panose="020B0004020202020204" pitchFamily="34" charset="0"/>
               </a:rPr>
               <a:t>Sokszínűség az ételek terén.</a:t>
@@ -4036,6 +4266,61 @@
       </p:par>
     </p:tnLst>
   </p:timing>
+</p:sld>
+</file>
+
+<file path=ppt/slides/slide5.xml><?xml version="1.0" encoding="utf-8"?>
+<p:sld xmlns:a="http://schemas.openxmlformats.org/drawingml/2006/main" xmlns:r="http://schemas.openxmlformats.org/officeDocument/2006/relationships" xmlns:p="http://schemas.openxmlformats.org/presentationml/2006/main">
+  <p:cSld>
+    <p:spTree>
+      <p:nvGrpSpPr>
+        <p:cNvPr id="1" name=""/>
+        <p:cNvGrpSpPr/>
+        <p:nvPr/>
+      </p:nvGrpSpPr>
+      <p:grpSpPr>
+        <a:xfrm>
+          <a:off x="0" y="0"/>
+          <a:ext cx="0" cy="0"/>
+          <a:chOff x="0" y="0"/>
+          <a:chExt cx="0" cy="0"/>
+        </a:xfrm>
+      </p:grpSpPr>
+      <p:sp>
+        <p:nvSpPr>
+          <p:cNvPr id="3" name="Tartalom helye 2">
+            <a:extLst>
+              <a:ext uri="{FF2B5EF4-FFF2-40B4-BE49-F238E27FC236}">
+                <a16:creationId xmlns:a16="http://schemas.microsoft.com/office/drawing/2014/main" id="{64F56E13-9703-9ED9-5DCB-9B90657393E9}"/>
+              </a:ext>
+            </a:extLst>
+          </p:cNvPr>
+          <p:cNvSpPr>
+            <a:spLocks noGrp="1"/>
+          </p:cNvSpPr>
+          <p:nvPr>
+            <p:ph idx="1"/>
+          </p:nvPr>
+        </p:nvSpPr>
+        <p:spPr/>
+        <p:txBody>
+          <a:bodyPr/>
+          <a:lstStyle/>
+          <a:p>
+            <a:endParaRPr lang="hu-HU"/>
+          </a:p>
+        </p:txBody>
+      </p:sp>
+    </p:spTree>
+    <p:extLst>
+      <p:ext uri="{BB962C8B-B14F-4D97-AF65-F5344CB8AC3E}">
+        <p14:creationId xmlns:p14="http://schemas.microsoft.com/office/powerpoint/2010/main" val="3820943455"/>
+      </p:ext>
+    </p:extLst>
+  </p:cSld>
+  <p:clrMapOvr>
+    <a:masterClrMapping/>
+  </p:clrMapOvr>
 </p:sld>
 </file>
 

</xml_diff>